<commit_message>
add lua value and type to  lua.ppt
</commit_message>
<xml_diff>
--- a/lua.pptx
+++ b/lua.pptx
@@ -245,7 +245,7 @@
           <a:p>
             <a:fld id="{10DEE658-3341-4EBD-8F4E-DECCE114D94C}" type="datetimeFigureOut">
               <a:rPr lang="zh-CN" altLang="en-US" smtClean="0"/>
-              <a:t>2017/5/22</a:t>
+              <a:t>2017/5/23</a:t>
             </a:fld>
             <a:endParaRPr lang="zh-CN" altLang="en-US"/>
           </a:p>
@@ -415,7 +415,7 @@
           <a:p>
             <a:fld id="{10DEE658-3341-4EBD-8F4E-DECCE114D94C}" type="datetimeFigureOut">
               <a:rPr lang="zh-CN" altLang="en-US" smtClean="0"/>
-              <a:t>2017/5/22</a:t>
+              <a:t>2017/5/23</a:t>
             </a:fld>
             <a:endParaRPr lang="zh-CN" altLang="en-US"/>
           </a:p>
@@ -595,7 +595,7 @@
           <a:p>
             <a:fld id="{10DEE658-3341-4EBD-8F4E-DECCE114D94C}" type="datetimeFigureOut">
               <a:rPr lang="zh-CN" altLang="en-US" smtClean="0"/>
-              <a:t>2017/5/22</a:t>
+              <a:t>2017/5/23</a:t>
             </a:fld>
             <a:endParaRPr lang="zh-CN" altLang="en-US"/>
           </a:p>
@@ -765,7 +765,7 @@
           <a:p>
             <a:fld id="{10DEE658-3341-4EBD-8F4E-DECCE114D94C}" type="datetimeFigureOut">
               <a:rPr lang="zh-CN" altLang="en-US" smtClean="0"/>
-              <a:t>2017/5/22</a:t>
+              <a:t>2017/5/23</a:t>
             </a:fld>
             <a:endParaRPr lang="zh-CN" altLang="en-US"/>
           </a:p>
@@ -1011,7 +1011,7 @@
           <a:p>
             <a:fld id="{10DEE658-3341-4EBD-8F4E-DECCE114D94C}" type="datetimeFigureOut">
               <a:rPr lang="zh-CN" altLang="en-US" smtClean="0"/>
-              <a:t>2017/5/22</a:t>
+              <a:t>2017/5/23</a:t>
             </a:fld>
             <a:endParaRPr lang="zh-CN" altLang="en-US"/>
           </a:p>
@@ -1243,7 +1243,7 @@
           <a:p>
             <a:fld id="{10DEE658-3341-4EBD-8F4E-DECCE114D94C}" type="datetimeFigureOut">
               <a:rPr lang="zh-CN" altLang="en-US" smtClean="0"/>
-              <a:t>2017/5/22</a:t>
+              <a:t>2017/5/23</a:t>
             </a:fld>
             <a:endParaRPr lang="zh-CN" altLang="en-US"/>
           </a:p>
@@ -1610,7 +1610,7 @@
           <a:p>
             <a:fld id="{10DEE658-3341-4EBD-8F4E-DECCE114D94C}" type="datetimeFigureOut">
               <a:rPr lang="zh-CN" altLang="en-US" smtClean="0"/>
-              <a:t>2017/5/22</a:t>
+              <a:t>2017/5/23</a:t>
             </a:fld>
             <a:endParaRPr lang="zh-CN" altLang="en-US"/>
           </a:p>
@@ -1728,7 +1728,7 @@
           <a:p>
             <a:fld id="{10DEE658-3341-4EBD-8F4E-DECCE114D94C}" type="datetimeFigureOut">
               <a:rPr lang="zh-CN" altLang="en-US" smtClean="0"/>
-              <a:t>2017/5/22</a:t>
+              <a:t>2017/5/23</a:t>
             </a:fld>
             <a:endParaRPr lang="zh-CN" altLang="en-US"/>
           </a:p>
@@ -1823,7 +1823,7 @@
           <a:p>
             <a:fld id="{10DEE658-3341-4EBD-8F4E-DECCE114D94C}" type="datetimeFigureOut">
               <a:rPr lang="zh-CN" altLang="en-US" smtClean="0"/>
-              <a:t>2017/5/22</a:t>
+              <a:t>2017/5/23</a:t>
             </a:fld>
             <a:endParaRPr lang="zh-CN" altLang="en-US"/>
           </a:p>
@@ -2100,7 +2100,7 @@
           <a:p>
             <a:fld id="{10DEE658-3341-4EBD-8F4E-DECCE114D94C}" type="datetimeFigureOut">
               <a:rPr lang="zh-CN" altLang="en-US" smtClean="0"/>
-              <a:t>2017/5/22</a:t>
+              <a:t>2017/5/23</a:t>
             </a:fld>
             <a:endParaRPr lang="zh-CN" altLang="en-US"/>
           </a:p>
@@ -2353,7 +2353,7 @@
           <a:p>
             <a:fld id="{10DEE658-3341-4EBD-8F4E-DECCE114D94C}" type="datetimeFigureOut">
               <a:rPr lang="zh-CN" altLang="en-US" smtClean="0"/>
-              <a:t>2017/5/22</a:t>
+              <a:t>2017/5/23</a:t>
             </a:fld>
             <a:endParaRPr lang="zh-CN" altLang="en-US"/>
           </a:p>
@@ -2566,7 +2566,7 @@
           <a:p>
             <a:fld id="{10DEE658-3341-4EBD-8F4E-DECCE114D94C}" type="datetimeFigureOut">
               <a:rPr lang="zh-CN" altLang="en-US" smtClean="0"/>
-              <a:t>2017/5/22</a:t>
+              <a:t>2017/5/23</a:t>
             </a:fld>
             <a:endParaRPr lang="zh-CN" altLang="en-US"/>
           </a:p>
@@ -3006,10 +3006,47 @@
         </p:nvSpPr>
         <p:spPr/>
         <p:txBody>
-          <a:bodyPr/>
-          <a:lstStyle/>
-          <a:p>
-            <a:endParaRPr lang="zh-CN" altLang="en-US"/>
+          <a:bodyPr>
+            <a:normAutofit fontScale="92500" lnSpcReduction="20000"/>
+          </a:bodyPr>
+          <a:lstStyle/>
+          <a:p>
+            <a:r>
+              <a:rPr lang="en-US" altLang="zh-CN" dirty="0" err="1"/>
+              <a:t>Lua</a:t>
+            </a:r>
+            <a:r>
+              <a:rPr lang="en-US" altLang="zh-CN" dirty="0"/>
+              <a:t> is an extension programming language designed to support general procedural programming with data description facilities. It also offers good support for object-oriented programming, functional programming, and data-driven programming. </a:t>
+            </a:r>
+            <a:r>
+              <a:rPr lang="en-US" altLang="zh-CN" dirty="0" err="1"/>
+              <a:t>Lua</a:t>
+            </a:r>
+            <a:r>
+              <a:rPr lang="en-US" altLang="zh-CN" dirty="0"/>
+              <a:t> is intended to be used as a powerful, light-weight scripting language for any program that needs one. </a:t>
+            </a:r>
+            <a:r>
+              <a:rPr lang="en-US" altLang="zh-CN" dirty="0" err="1"/>
+              <a:t>Lua</a:t>
+            </a:r>
+            <a:r>
+              <a:rPr lang="en-US" altLang="zh-CN" dirty="0"/>
+              <a:t> is implemented as a library, written in </a:t>
+            </a:r>
+            <a:r>
+              <a:rPr lang="en-US" altLang="zh-CN" i="1" dirty="0"/>
+              <a:t>clean</a:t>
+            </a:r>
+            <a:r>
+              <a:rPr lang="en-US" altLang="zh-CN" dirty="0"/>
+              <a:t> C (that is, in the common subset of ANSI C and C++)</a:t>
+            </a:r>
+            <a:endParaRPr lang="zh-CN" altLang="en-US" dirty="0"/>
+          </a:p>
+          <a:p>
+            <a:endParaRPr lang="zh-CN" altLang="en-US" dirty="0"/>
           </a:p>
         </p:txBody>
       </p:sp>
@@ -3058,7 +3095,15 @@
           <a:bodyPr/>
           <a:lstStyle/>
           <a:p>
-            <a:endParaRPr lang="zh-CN" altLang="en-US"/>
+            <a:r>
+              <a:rPr lang="en-US" altLang="zh-CN" dirty="0" err="1"/>
+              <a:t>Lua</a:t>
+            </a:r>
+            <a:r>
+              <a:rPr lang="en-US" altLang="zh-CN" dirty="0"/>
+              <a:t> value and type</a:t>
+            </a:r>
+            <a:endParaRPr lang="zh-CN" altLang="en-US" dirty="0"/>
           </a:p>
         </p:txBody>
       </p:sp>
@@ -3074,19 +3119,102 @@
         </p:nvSpPr>
         <p:spPr/>
         <p:txBody>
-          <a:bodyPr/>
-          <a:lstStyle/>
-          <a:p>
-            <a:r>
-              <a:rPr lang="en-US" altLang="zh-CN" dirty="0" smtClean="0"/>
-              <a:t>Table</a:t>
-            </a:r>
-          </a:p>
-          <a:p>
-            <a:r>
-              <a:rPr lang="en-US" altLang="zh-CN" smtClean="0"/>
+          <a:bodyPr>
+            <a:normAutofit fontScale="92500" lnSpcReduction="20000"/>
+          </a:bodyPr>
+          <a:lstStyle/>
+          <a:p>
+            <a:r>
+              <a:rPr lang="en-US" altLang="zh-CN" dirty="0"/>
+              <a:t>nil</a:t>
+            </a:r>
+          </a:p>
+          <a:p>
+            <a:r>
+              <a:rPr lang="en-US" altLang="zh-CN" dirty="0" err="1"/>
+              <a:t>boolean</a:t>
+            </a:r>
+            <a:endParaRPr lang="en-US" altLang="zh-CN" dirty="0"/>
+          </a:p>
+          <a:p>
+            <a:r>
+              <a:rPr lang="en-US" altLang="zh-CN" dirty="0"/>
+              <a:t>number</a:t>
+            </a:r>
+          </a:p>
+          <a:p>
+            <a:r>
+              <a:rPr lang="en-US" altLang="zh-CN" dirty="0"/>
+              <a:t>string</a:t>
+            </a:r>
+          </a:p>
+          <a:p>
+            <a:r>
+              <a:rPr lang="en-US" altLang="zh-CN" dirty="0"/>
+              <a:t>function</a:t>
+            </a:r>
+          </a:p>
+          <a:p>
+            <a:r>
+              <a:rPr lang="en-US" altLang="zh-CN" dirty="0" err="1"/>
               <a:t>userdata</a:t>
             </a:r>
+            <a:r>
+              <a:rPr lang="en-US" altLang="zh-CN" dirty="0"/>
+              <a:t>(allow arbitrary C data to be stored in </a:t>
+            </a:r>
+            <a:r>
+              <a:rPr lang="en-US" altLang="zh-CN" dirty="0" err="1"/>
+              <a:t>Lua</a:t>
+            </a:r>
+            <a:r>
+              <a:rPr lang="en-US" altLang="zh-CN" dirty="0"/>
+              <a:t> variables)</a:t>
+            </a:r>
+          </a:p>
+          <a:p>
+            <a:r>
+              <a:rPr lang="en-US" altLang="zh-CN" dirty="0"/>
+              <a:t>thread</a:t>
+            </a:r>
+          </a:p>
+          <a:p>
+            <a:r>
+              <a:rPr lang="en-US" altLang="zh-CN" dirty="0"/>
+              <a:t>table</a:t>
+            </a:r>
+          </a:p>
+          <a:p>
+            <a:pPr lvl="1"/>
+            <a:r>
+              <a:rPr lang="en-US" altLang="zh-CN" dirty="0" err="1"/>
+              <a:t>metatable</a:t>
+            </a:r>
+            <a:endParaRPr lang="en-US" altLang="zh-CN" dirty="0"/>
+          </a:p>
+          <a:p>
+            <a:pPr lvl="1"/>
+            <a:r>
+              <a:rPr lang="en-US" altLang="zh-CN" dirty="0" err="1"/>
+              <a:t>Rawget</a:t>
+            </a:r>
+            <a:endParaRPr lang="en-US" altLang="zh-CN" dirty="0"/>
+          </a:p>
+          <a:p>
+            <a:pPr lvl="1"/>
+            <a:r>
+              <a:rPr lang="en-US" altLang="zh-CN" dirty="0" err="1"/>
+              <a:t>rawset</a:t>
+            </a:r>
+            <a:endParaRPr lang="en-US" altLang="zh-CN" dirty="0"/>
+          </a:p>
+          <a:p>
+            <a:pPr marL="0" indent="0">
+              <a:buNone/>
+            </a:pPr>
+            <a:endParaRPr lang="en-US" altLang="zh-CN"/>
+          </a:p>
+          <a:p>
             <a:endParaRPr lang="zh-CN" altLang="en-US" dirty="0"/>
           </a:p>
         </p:txBody>

</xml_diff>